<commit_message>
added thread for every outlet unused
</commit_message>
<xml_diff>
--- a/documentation/4_ IESC-RO (3).pptx
+++ b/documentation/4_ IESC-RO (3).pptx
@@ -10642,7 +10642,7 @@
         <p:spPr>
           <a:xfrm>
             <a:off x="2363372" y="1448780"/>
-            <a:ext cx="7848872" cy="2369880"/>
+            <a:ext cx="7848872" cy="2629951"/>
           </a:xfrm>
           <a:prstGeom prst="rect">
             <a:avLst/>
@@ -10685,11 +10685,7 @@
             </a:r>
           </a:p>
           <a:p>
-            <a:pPr lvl="1" algn="just">
-              <a:lnSpc>
-                <a:spcPct val="150000"/>
-              </a:lnSpc>
-            </a:pPr>
+            <a:pPr algn="just"/>
             <a:endParaRPr lang="ro-RO" sz="2000" dirty="0">
               <a:solidFill>
                 <a:schemeClr val="bg2"/>
@@ -10712,7 +10708,7 @@
                 </a:solidFill>
                 <a:latin typeface="UT Sans"/>
               </a:rPr>
-              <a:t>Arhitectură</a:t>
+              <a:t>Prezentare</a:t>
             </a:r>
             <a:r>
               <a:rPr lang="en-US" sz="2000" dirty="0">
@@ -10730,24 +10726,8 @@
                 </a:solidFill>
                 <a:latin typeface="UT Sans"/>
               </a:rPr>
-              <a:t>proiect</a:t>
-            </a:r>
-            <a:endParaRPr lang="ro-RO" sz="2000" dirty="0">
-              <a:solidFill>
-                <a:schemeClr val="bg2"/>
-              </a:solidFill>
-              <a:latin typeface="UT Sans Bold"/>
-            </a:endParaRPr>
-          </a:p>
-          <a:p>
-            <a:pPr marL="800100" lvl="1" indent="-342900" algn="just">
-              <a:lnSpc>
-                <a:spcPct val="150000"/>
-              </a:lnSpc>
-              <a:buBlip>
-                <a:blip r:embed="rId2"/>
-              </a:buBlip>
-            </a:pPr>
+              <a:t>scenarii</a:t>
+            </a:r>
             <a:endParaRPr lang="ro-RO" sz="2000" dirty="0">
               <a:solidFill>
                 <a:schemeClr val="bg2"/>
@@ -10768,7 +10748,7 @@
                 </a:solidFill>
                 <a:latin typeface="UT Sans"/>
               </a:rPr>
-              <a:t>Tehnologii</a:t>
+              <a:t>Arhitectura</a:t>
             </a:r>
             <a:r>
               <a:rPr lang="en-US" sz="2000" dirty="0">
@@ -10786,8 +10766,61 @@
                 </a:solidFill>
                 <a:latin typeface="UT Sans"/>
               </a:rPr>
+              <a:t>proiectului</a:t>
+            </a:r>
+            <a:endParaRPr lang="en-US" sz="2000" dirty="0">
+              <a:solidFill>
+                <a:schemeClr val="bg2"/>
+              </a:solidFill>
+              <a:latin typeface="UT Sans"/>
+            </a:endParaRPr>
+          </a:p>
+          <a:p>
+            <a:pPr lvl="1" algn="just">
+              <a:lnSpc>
+                <a:spcPct val="150000"/>
+              </a:lnSpc>
+            </a:pPr>
+            <a:r>
+              <a:rPr lang="en-US" sz="2000" dirty="0" err="1">
+                <a:solidFill>
+                  <a:schemeClr val="bg2"/>
+                </a:solidFill>
+                <a:latin typeface="UT Sans"/>
+              </a:rPr>
+              <a:t>Tehnologiile</a:t>
+            </a:r>
+            <a:r>
+              <a:rPr lang="en-US" sz="2000" dirty="0">
+                <a:solidFill>
+                  <a:schemeClr val="bg2"/>
+                </a:solidFill>
+                <a:latin typeface="UT Sans"/>
+              </a:rPr>
+              <a:t> </a:t>
+            </a:r>
+            <a:r>
+              <a:rPr lang="en-US" sz="2000" dirty="0" err="1">
+                <a:solidFill>
+                  <a:schemeClr val="bg2"/>
+                </a:solidFill>
+                <a:latin typeface="UT Sans"/>
+              </a:rPr>
               <a:t>folosite</a:t>
             </a:r>
+            <a:endParaRPr lang="en-US" sz="2000" dirty="0">
+              <a:solidFill>
+                <a:schemeClr val="bg2"/>
+              </a:solidFill>
+              <a:latin typeface="UT Sans"/>
+            </a:endParaRPr>
+          </a:p>
+          <a:p>
+            <a:pPr lvl="1" algn="just">
+              <a:lnSpc>
+                <a:spcPct val="150000"/>
+              </a:lnSpc>
+            </a:pPr>
             <a:endParaRPr lang="en-US" sz="2000" dirty="0">
               <a:solidFill>
                 <a:schemeClr val="bg2"/>
@@ -10806,7 +10839,7 @@
           <p:nvPr/>
         </p:nvPicPr>
         <p:blipFill>
-          <a:blip r:embed="rId3" cstate="print">
+          <a:blip r:embed="rId2" cstate="print">
             <a:extLst>
               <a:ext uri="{28A0092B-C50C-407E-A947-70E740481C1C}">
                 <a14:useLocalDpi xmlns:a14="http://schemas.microsoft.com/office/drawing/2010/main" val="0"/>
@@ -15253,7 +15286,7 @@
         </p:nvSpPr>
         <p:spPr>
           <a:xfrm>
-            <a:off x="2315581" y="1448781"/>
+            <a:off x="3575720" y="1415887"/>
             <a:ext cx="1774845" cy="461665"/>
           </a:xfrm>
           <a:prstGeom prst="rect">
@@ -15287,7 +15320,7 @@
         </p:nvSpPr>
         <p:spPr>
           <a:xfrm>
-            <a:off x="3687476" y="1439395"/>
+            <a:off x="4947615" y="1406501"/>
             <a:ext cx="1289969" cy="461665"/>
           </a:xfrm>
           <a:prstGeom prst="rect">
@@ -15321,7 +15354,7 @@
         </p:nvSpPr>
         <p:spPr>
           <a:xfrm>
-            <a:off x="4655840" y="1430009"/>
+            <a:off x="5915979" y="1397115"/>
             <a:ext cx="2321469" cy="461665"/>
           </a:xfrm>
           <a:prstGeom prst="rect">
@@ -15347,16 +15380,677 @@
           </a:p>
         </p:txBody>
       </p:sp>
+      <p:grpSp>
+        <p:nvGrpSpPr>
+          <p:cNvPr id="2" name="Group 1">
+            <a:extLst>
+              <a:ext uri="{FF2B5EF4-FFF2-40B4-BE49-F238E27FC236}">
+                <a16:creationId xmlns:a16="http://schemas.microsoft.com/office/drawing/2014/main" id="{406D7FC2-AE14-489F-980F-14AE8A17808E}"/>
+              </a:ext>
+            </a:extLst>
+          </p:cNvPr>
+          <p:cNvGrpSpPr/>
+          <p:nvPr/>
+        </p:nvGrpSpPr>
+        <p:grpSpPr>
+          <a:xfrm>
+            <a:off x="5337755" y="2558824"/>
+            <a:ext cx="5510674" cy="2464456"/>
+            <a:chOff x="2126517" y="2258869"/>
+            <a:chExt cx="8189570" cy="3346833"/>
+          </a:xfrm>
+        </p:grpSpPr>
+        <p:sp>
+          <p:nvSpPr>
+            <p:cNvPr id="25" name="TextBox 24"/>
+            <p:cNvSpPr txBox="1"/>
+            <p:nvPr/>
+          </p:nvSpPr>
+          <p:spPr>
+            <a:xfrm>
+              <a:off x="2703236" y="3704283"/>
+              <a:ext cx="245580" cy="923330"/>
+            </a:xfrm>
+            <a:prstGeom prst="rect">
+              <a:avLst/>
+            </a:prstGeom>
+            <a:noFill/>
+          </p:spPr>
+          <p:txBody>
+            <a:bodyPr wrap="none" rtlCol="0">
+              <a:spAutoFit/>
+            </a:bodyPr>
+            <a:lstStyle/>
+            <a:p>
+              <a:r>
+                <a:rPr lang="en-US" b="1" dirty="0">
+                  <a:solidFill>
+                    <a:schemeClr val="bg1"/>
+                  </a:solidFill>
+                </a:rPr>
+                <a:t>.</a:t>
+              </a:r>
+            </a:p>
+            <a:p>
+              <a:r>
+                <a:rPr lang="en-US" b="1" dirty="0">
+                  <a:solidFill>
+                    <a:schemeClr val="bg1"/>
+                  </a:solidFill>
+                </a:rPr>
+                <a:t>.</a:t>
+              </a:r>
+            </a:p>
+            <a:p>
+              <a:r>
+                <a:rPr lang="en-US" b="1" dirty="0">
+                  <a:solidFill>
+                    <a:schemeClr val="bg1"/>
+                  </a:solidFill>
+                </a:rPr>
+                <a:t>.</a:t>
+              </a:r>
+            </a:p>
+          </p:txBody>
+        </p:sp>
+        <p:sp>
+          <p:nvSpPr>
+            <p:cNvPr id="26" name="Rounded Rectangle 25"/>
+            <p:cNvSpPr/>
+            <p:nvPr/>
+          </p:nvSpPr>
+          <p:spPr>
+            <a:xfrm>
+              <a:off x="4979876" y="2258869"/>
+              <a:ext cx="1872208" cy="3346833"/>
+            </a:xfrm>
+            <a:prstGeom prst="roundRect">
+              <a:avLst/>
+            </a:prstGeom>
+            <a:noFill/>
+            <a:ln w="38100">
+              <a:solidFill>
+                <a:srgbClr val="288ABA"/>
+              </a:solidFill>
+            </a:ln>
+          </p:spPr>
+          <p:style>
+            <a:lnRef idx="2">
+              <a:schemeClr val="accent1">
+                <a:shade val="50000"/>
+              </a:schemeClr>
+            </a:lnRef>
+            <a:fillRef idx="1">
+              <a:schemeClr val="accent1"/>
+            </a:fillRef>
+            <a:effectRef idx="0">
+              <a:schemeClr val="accent1"/>
+            </a:effectRef>
+            <a:fontRef idx="minor">
+              <a:schemeClr val="lt1"/>
+            </a:fontRef>
+          </p:style>
+          <p:txBody>
+            <a:bodyPr rtlCol="0" anchor="ctr"/>
+            <a:lstStyle/>
+            <a:p>
+              <a:pPr algn="ctr"/>
+              <a:r>
+                <a:rPr lang="en-US" sz="2000" dirty="0" err="1"/>
+                <a:t>Motorul</a:t>
+              </a:r>
+              <a:endParaRPr lang="en-US" sz="2000" dirty="0"/>
+            </a:p>
+            <a:p>
+              <a:pPr algn="ctr"/>
+              <a:r>
+                <a:rPr lang="en-US" sz="2000" dirty="0"/>
+                <a:t>CEP</a:t>
+              </a:r>
+            </a:p>
+          </p:txBody>
+        </p:sp>
+        <p:sp>
+          <p:nvSpPr>
+            <p:cNvPr id="29" name="Right Arrow 28"/>
+            <p:cNvSpPr/>
+            <p:nvPr/>
+          </p:nvSpPr>
+          <p:spPr>
+            <a:xfrm>
+              <a:off x="3802766" y="2507170"/>
+              <a:ext cx="1059390" cy="182701"/>
+            </a:xfrm>
+            <a:prstGeom prst="rightArrow">
+              <a:avLst>
+                <a:gd name="adj1" fmla="val 50000"/>
+                <a:gd name="adj2" fmla="val 212259"/>
+              </a:avLst>
+            </a:prstGeom>
+            <a:solidFill>
+              <a:schemeClr val="accent1"/>
+            </a:solidFill>
+            <a:ln>
+              <a:solidFill>
+                <a:schemeClr val="accent1"/>
+              </a:solidFill>
+            </a:ln>
+          </p:spPr>
+          <p:style>
+            <a:lnRef idx="2">
+              <a:schemeClr val="accent1">
+                <a:shade val="50000"/>
+              </a:schemeClr>
+            </a:lnRef>
+            <a:fillRef idx="1">
+              <a:schemeClr val="accent1"/>
+            </a:fillRef>
+            <a:effectRef idx="0">
+              <a:schemeClr val="accent1"/>
+            </a:effectRef>
+            <a:fontRef idx="minor">
+              <a:schemeClr val="lt1"/>
+            </a:fontRef>
+          </p:style>
+          <p:txBody>
+            <a:bodyPr rtlCol="0" anchor="ctr"/>
+            <a:lstStyle/>
+            <a:p>
+              <a:pPr algn="ctr"/>
+              <a:endParaRPr lang="en-US"/>
+            </a:p>
+          </p:txBody>
+        </p:sp>
+        <p:sp>
+          <p:nvSpPr>
+            <p:cNvPr id="31" name="Right Arrow 30"/>
+            <p:cNvSpPr/>
+            <p:nvPr/>
+          </p:nvSpPr>
+          <p:spPr>
+            <a:xfrm>
+              <a:off x="3802766" y="3379424"/>
+              <a:ext cx="1059390" cy="182701"/>
+            </a:xfrm>
+            <a:prstGeom prst="rightArrow">
+              <a:avLst>
+                <a:gd name="adj1" fmla="val 50000"/>
+                <a:gd name="adj2" fmla="val 212259"/>
+              </a:avLst>
+            </a:prstGeom>
+            <a:solidFill>
+              <a:schemeClr val="accent1"/>
+            </a:solidFill>
+            <a:ln>
+              <a:solidFill>
+                <a:schemeClr val="accent1"/>
+              </a:solidFill>
+            </a:ln>
+          </p:spPr>
+          <p:style>
+            <a:lnRef idx="2">
+              <a:schemeClr val="accent1">
+                <a:shade val="50000"/>
+              </a:schemeClr>
+            </a:lnRef>
+            <a:fillRef idx="1">
+              <a:schemeClr val="accent1"/>
+            </a:fillRef>
+            <a:effectRef idx="0">
+              <a:schemeClr val="accent1"/>
+            </a:effectRef>
+            <a:fontRef idx="minor">
+              <a:schemeClr val="lt1"/>
+            </a:fontRef>
+          </p:style>
+          <p:txBody>
+            <a:bodyPr rtlCol="0" anchor="ctr"/>
+            <a:lstStyle/>
+            <a:p>
+              <a:pPr algn="ctr"/>
+              <a:endParaRPr lang="en-US"/>
+            </a:p>
+          </p:txBody>
+        </p:sp>
+        <p:sp>
+          <p:nvSpPr>
+            <p:cNvPr id="32" name="Right Arrow 31"/>
+            <p:cNvSpPr/>
+            <p:nvPr/>
+          </p:nvSpPr>
+          <p:spPr>
+            <a:xfrm>
+              <a:off x="3783525" y="5157146"/>
+              <a:ext cx="1059390" cy="182701"/>
+            </a:xfrm>
+            <a:prstGeom prst="rightArrow">
+              <a:avLst>
+                <a:gd name="adj1" fmla="val 50000"/>
+                <a:gd name="adj2" fmla="val 212259"/>
+              </a:avLst>
+            </a:prstGeom>
+            <a:solidFill>
+              <a:schemeClr val="accent1"/>
+            </a:solidFill>
+            <a:ln>
+              <a:solidFill>
+                <a:schemeClr val="accent1"/>
+              </a:solidFill>
+            </a:ln>
+          </p:spPr>
+          <p:style>
+            <a:lnRef idx="2">
+              <a:schemeClr val="accent1">
+                <a:shade val="50000"/>
+              </a:schemeClr>
+            </a:lnRef>
+            <a:fillRef idx="1">
+              <a:schemeClr val="accent1"/>
+            </a:fillRef>
+            <a:effectRef idx="0">
+              <a:schemeClr val="accent1"/>
+            </a:effectRef>
+            <a:fontRef idx="minor">
+              <a:schemeClr val="lt1"/>
+            </a:fontRef>
+          </p:style>
+          <p:txBody>
+            <a:bodyPr rtlCol="0" anchor="ctr"/>
+            <a:lstStyle/>
+            <a:p>
+              <a:pPr algn="ctr"/>
+              <a:endParaRPr lang="en-US"/>
+            </a:p>
+          </p:txBody>
+        </p:sp>
+        <p:sp>
+          <p:nvSpPr>
+            <p:cNvPr id="33" name="Right Arrow 32"/>
+            <p:cNvSpPr/>
+            <p:nvPr/>
+          </p:nvSpPr>
+          <p:spPr>
+            <a:xfrm>
+              <a:off x="7109578" y="3768879"/>
+              <a:ext cx="1442545" cy="195237"/>
+            </a:xfrm>
+            <a:prstGeom prst="rightArrow">
+              <a:avLst>
+                <a:gd name="adj1" fmla="val 50000"/>
+                <a:gd name="adj2" fmla="val 212259"/>
+              </a:avLst>
+            </a:prstGeom>
+            <a:solidFill>
+              <a:schemeClr val="accent1"/>
+            </a:solidFill>
+            <a:ln>
+              <a:solidFill>
+                <a:schemeClr val="accent1"/>
+              </a:solidFill>
+            </a:ln>
+          </p:spPr>
+          <p:style>
+            <a:lnRef idx="2">
+              <a:schemeClr val="accent1">
+                <a:shade val="50000"/>
+              </a:schemeClr>
+            </a:lnRef>
+            <a:fillRef idx="1">
+              <a:schemeClr val="accent1"/>
+            </a:fillRef>
+            <a:effectRef idx="0">
+              <a:schemeClr val="accent1"/>
+            </a:effectRef>
+            <a:fontRef idx="minor">
+              <a:schemeClr val="lt1"/>
+            </a:fontRef>
+          </p:style>
+          <p:txBody>
+            <a:bodyPr rtlCol="0" anchor="ctr"/>
+            <a:lstStyle/>
+            <a:p>
+              <a:pPr algn="ctr"/>
+              <a:endParaRPr lang="en-US"/>
+            </a:p>
+          </p:txBody>
+        </p:sp>
+        <p:sp>
+          <p:nvSpPr>
+            <p:cNvPr id="8" name="Rounded Rectangle 7"/>
+            <p:cNvSpPr/>
+            <p:nvPr/>
+          </p:nvSpPr>
+          <p:spPr>
+            <a:xfrm>
+              <a:off x="8805084" y="3566576"/>
+              <a:ext cx="1511003" cy="612068"/>
+            </a:xfrm>
+            <a:prstGeom prst="roundRect">
+              <a:avLst/>
+            </a:prstGeom>
+            <a:noFill/>
+            <a:ln w="38100"/>
+          </p:spPr>
+          <p:style>
+            <a:lnRef idx="2">
+              <a:schemeClr val="accent1">
+                <a:shade val="50000"/>
+              </a:schemeClr>
+            </a:lnRef>
+            <a:fillRef idx="1">
+              <a:schemeClr val="accent1"/>
+            </a:fillRef>
+            <a:effectRef idx="0">
+              <a:schemeClr val="accent1"/>
+            </a:effectRef>
+            <a:fontRef idx="minor">
+              <a:schemeClr val="lt1"/>
+            </a:fontRef>
+          </p:style>
+          <p:txBody>
+            <a:bodyPr rtlCol="0" anchor="ctr"/>
+            <a:lstStyle/>
+            <a:p>
+              <a:pPr algn="ctr"/>
+              <a:endParaRPr lang="en-US"/>
+            </a:p>
+          </p:txBody>
+        </p:sp>
+        <p:sp>
+          <p:nvSpPr>
+            <p:cNvPr id="9" name="Rectangle 8"/>
+            <p:cNvSpPr/>
+            <p:nvPr/>
+          </p:nvSpPr>
+          <p:spPr>
+            <a:xfrm>
+              <a:off x="2187711" y="2345713"/>
+              <a:ext cx="1031049" cy="307778"/>
+            </a:xfrm>
+            <a:prstGeom prst="rect">
+              <a:avLst/>
+            </a:prstGeom>
+          </p:spPr>
+          <p:txBody>
+            <a:bodyPr wrap="none">
+              <a:spAutoFit/>
+            </a:bodyPr>
+            <a:lstStyle/>
+            <a:p>
+              <a:r>
+                <a:rPr lang="en-US" sz="1400" dirty="0" err="1">
+                  <a:solidFill>
+                    <a:schemeClr val="bg1"/>
+                  </a:solidFill>
+                  <a:latin typeface="UT Sans"/>
+                </a:rPr>
+                <a:t>Eveniment</a:t>
+              </a:r>
+              <a:endParaRPr lang="en-US" dirty="0">
+                <a:solidFill>
+                  <a:schemeClr val="bg1"/>
+                </a:solidFill>
+              </a:endParaRPr>
+            </a:p>
+          </p:txBody>
+        </p:sp>
+        <p:sp>
+          <p:nvSpPr>
+            <p:cNvPr id="40" name="Rounded Rectangle 39"/>
+            <p:cNvSpPr/>
+            <p:nvPr/>
+          </p:nvSpPr>
+          <p:spPr>
+            <a:xfrm>
+              <a:off x="2135560" y="3156811"/>
+              <a:ext cx="1492918" cy="612068"/>
+            </a:xfrm>
+            <a:prstGeom prst="roundRect">
+              <a:avLst/>
+            </a:prstGeom>
+            <a:noFill/>
+            <a:ln w="38100"/>
+          </p:spPr>
+          <p:style>
+            <a:lnRef idx="2">
+              <a:schemeClr val="accent1">
+                <a:shade val="50000"/>
+              </a:schemeClr>
+            </a:lnRef>
+            <a:fillRef idx="1">
+              <a:schemeClr val="accent1"/>
+            </a:fillRef>
+            <a:effectRef idx="0">
+              <a:schemeClr val="accent1"/>
+            </a:effectRef>
+            <a:fontRef idx="minor">
+              <a:schemeClr val="lt1"/>
+            </a:fontRef>
+          </p:style>
+          <p:txBody>
+            <a:bodyPr rtlCol="0" anchor="ctr"/>
+            <a:lstStyle/>
+            <a:p>
+              <a:pPr algn="ctr"/>
+              <a:endParaRPr lang="en-US"/>
+            </a:p>
+          </p:txBody>
+        </p:sp>
+        <p:sp>
+          <p:nvSpPr>
+            <p:cNvPr id="41" name="Rectangle 40"/>
+            <p:cNvSpPr/>
+            <p:nvPr/>
+          </p:nvSpPr>
+          <p:spPr>
+            <a:xfrm>
+              <a:off x="2187711" y="3225535"/>
+              <a:ext cx="1031049" cy="307778"/>
+            </a:xfrm>
+            <a:prstGeom prst="rect">
+              <a:avLst/>
+            </a:prstGeom>
+          </p:spPr>
+          <p:txBody>
+            <a:bodyPr wrap="none">
+              <a:spAutoFit/>
+            </a:bodyPr>
+            <a:lstStyle/>
+            <a:p>
+              <a:r>
+                <a:rPr lang="en-US" sz="1400" dirty="0" err="1">
+                  <a:solidFill>
+                    <a:schemeClr val="bg1"/>
+                  </a:solidFill>
+                  <a:latin typeface="UT Sans"/>
+                </a:rPr>
+                <a:t>Eveniment</a:t>
+              </a:r>
+              <a:endParaRPr lang="en-US" dirty="0">
+                <a:solidFill>
+                  <a:schemeClr val="bg1"/>
+                </a:solidFill>
+              </a:endParaRPr>
+            </a:p>
+          </p:txBody>
+        </p:sp>
+        <p:sp>
+          <p:nvSpPr>
+            <p:cNvPr id="42" name="Rounded Rectangle 41"/>
+            <p:cNvSpPr/>
+            <p:nvPr/>
+          </p:nvSpPr>
+          <p:spPr>
+            <a:xfrm>
+              <a:off x="2144603" y="4947555"/>
+              <a:ext cx="1492918" cy="612068"/>
+            </a:xfrm>
+            <a:prstGeom prst="roundRect">
+              <a:avLst/>
+            </a:prstGeom>
+            <a:noFill/>
+            <a:ln w="38100"/>
+          </p:spPr>
+          <p:style>
+            <a:lnRef idx="2">
+              <a:schemeClr val="accent1">
+                <a:shade val="50000"/>
+              </a:schemeClr>
+            </a:lnRef>
+            <a:fillRef idx="1">
+              <a:schemeClr val="accent1"/>
+            </a:fillRef>
+            <a:effectRef idx="0">
+              <a:schemeClr val="accent1"/>
+            </a:effectRef>
+            <a:fontRef idx="minor">
+              <a:schemeClr val="lt1"/>
+            </a:fontRef>
+          </p:style>
+          <p:txBody>
+            <a:bodyPr rtlCol="0" anchor="ctr"/>
+            <a:lstStyle/>
+            <a:p>
+              <a:pPr algn="ctr"/>
+              <a:endParaRPr lang="en-US"/>
+            </a:p>
+          </p:txBody>
+        </p:sp>
+        <p:sp>
+          <p:nvSpPr>
+            <p:cNvPr id="43" name="Rectangle 42"/>
+            <p:cNvSpPr/>
+            <p:nvPr/>
+          </p:nvSpPr>
+          <p:spPr>
+            <a:xfrm>
+              <a:off x="2197135" y="5032069"/>
+              <a:ext cx="1031049" cy="307778"/>
+            </a:xfrm>
+            <a:prstGeom prst="rect">
+              <a:avLst/>
+            </a:prstGeom>
+          </p:spPr>
+          <p:txBody>
+            <a:bodyPr wrap="none">
+              <a:spAutoFit/>
+            </a:bodyPr>
+            <a:lstStyle/>
+            <a:p>
+              <a:r>
+                <a:rPr lang="en-US" sz="1400" dirty="0" err="1">
+                  <a:solidFill>
+                    <a:schemeClr val="bg1"/>
+                  </a:solidFill>
+                  <a:latin typeface="UT Sans"/>
+                </a:rPr>
+                <a:t>Eveniment</a:t>
+              </a:r>
+              <a:endParaRPr lang="en-US" dirty="0">
+                <a:solidFill>
+                  <a:schemeClr val="bg1"/>
+                </a:solidFill>
+              </a:endParaRPr>
+            </a:p>
+          </p:txBody>
+        </p:sp>
+        <p:sp>
+          <p:nvSpPr>
+            <p:cNvPr id="44" name="Rounded Rectangle 43"/>
+            <p:cNvSpPr/>
+            <p:nvPr/>
+          </p:nvSpPr>
+          <p:spPr>
+            <a:xfrm>
+              <a:off x="2126517" y="2258869"/>
+              <a:ext cx="1511004" cy="612068"/>
+            </a:xfrm>
+            <a:prstGeom prst="roundRect">
+              <a:avLst/>
+            </a:prstGeom>
+            <a:noFill/>
+            <a:ln w="38100"/>
+          </p:spPr>
+          <p:style>
+            <a:lnRef idx="2">
+              <a:schemeClr val="accent1">
+                <a:shade val="50000"/>
+              </a:schemeClr>
+            </a:lnRef>
+            <a:fillRef idx="1">
+              <a:schemeClr val="accent1"/>
+            </a:fillRef>
+            <a:effectRef idx="0">
+              <a:schemeClr val="accent1"/>
+            </a:effectRef>
+            <a:fontRef idx="minor">
+              <a:schemeClr val="lt1"/>
+            </a:fontRef>
+          </p:style>
+          <p:txBody>
+            <a:bodyPr rtlCol="0" anchor="ctr"/>
+            <a:lstStyle/>
+            <a:p>
+              <a:pPr algn="ctr"/>
+              <a:endParaRPr lang="en-US"/>
+            </a:p>
+          </p:txBody>
+        </p:sp>
+        <p:sp>
+          <p:nvSpPr>
+            <p:cNvPr id="45" name="Rectangle 44"/>
+            <p:cNvSpPr/>
+            <p:nvPr/>
+          </p:nvSpPr>
+          <p:spPr>
+            <a:xfrm>
+              <a:off x="8899802" y="3624507"/>
+              <a:ext cx="1031049" cy="307778"/>
+            </a:xfrm>
+            <a:prstGeom prst="rect">
+              <a:avLst/>
+            </a:prstGeom>
+          </p:spPr>
+          <p:txBody>
+            <a:bodyPr wrap="none">
+              <a:spAutoFit/>
+            </a:bodyPr>
+            <a:lstStyle/>
+            <a:p>
+              <a:r>
+                <a:rPr lang="en-US" sz="1400" dirty="0" err="1">
+                  <a:solidFill>
+                    <a:schemeClr val="bg1"/>
+                  </a:solidFill>
+                  <a:latin typeface="UT Sans"/>
+                </a:rPr>
+                <a:t>Eveniment</a:t>
+              </a:r>
+              <a:endParaRPr lang="en-US" dirty="0">
+                <a:solidFill>
+                  <a:schemeClr val="bg1"/>
+                </a:solidFill>
+              </a:endParaRPr>
+            </a:p>
+          </p:txBody>
+        </p:sp>
+      </p:grpSp>
       <p:sp>
         <p:nvSpPr>
-          <p:cNvPr id="25" name="TextBox 24"/>
+          <p:cNvPr id="24" name="TextBox 23">
+            <a:extLst>
+              <a:ext uri="{FF2B5EF4-FFF2-40B4-BE49-F238E27FC236}">
+                <a16:creationId xmlns:a16="http://schemas.microsoft.com/office/drawing/2014/main" id="{6F129F32-5F84-4A3B-B807-55C02E14AC9D}"/>
+              </a:ext>
+            </a:extLst>
+          </p:cNvPr>
           <p:cNvSpPr txBox="1"/>
           <p:nvPr/>
         </p:nvSpPr>
         <p:spPr>
           <a:xfrm>
-            <a:off x="2761172" y="3868547"/>
-            <a:ext cx="245580" cy="923330"/>
+            <a:off x="2682052" y="1415886"/>
+            <a:ext cx="1018420" cy="461665"/>
           </a:xfrm>
           <a:prstGeom prst="rect">
             <a:avLst/>
@@ -15370,613 +16064,124 @@
           <a:lstStyle/>
           <a:p>
             <a:r>
-              <a:rPr lang="en-US" b="1" dirty="0">
+              <a:rPr lang="ro-RO" sz="2400" dirty="0">
                 <a:solidFill>
                   <a:schemeClr val="bg1"/>
                 </a:solidFill>
               </a:rPr>
-              <a:t>.</a:t>
-            </a:r>
-          </a:p>
-          <a:p>
-            <a:r>
-              <a:rPr lang="en-US" b="1" dirty="0">
+              <a:t>ESPER</a:t>
+            </a:r>
+            <a:r>
+              <a:rPr lang="en-US" sz="2400" dirty="0">
                 <a:solidFill>
                   <a:schemeClr val="bg1"/>
                 </a:solidFill>
-              </a:rPr>
-              <a:t>.</a:t>
-            </a:r>
-          </a:p>
-          <a:p>
-            <a:r>
-              <a:rPr lang="en-US" b="1" dirty="0">
-                <a:solidFill>
-                  <a:schemeClr val="bg1"/>
-                </a:solidFill>
-              </a:rPr>
-              <a:t>.</a:t>
+                <a:latin typeface="UT Sans"/>
+              </a:rPr>
+              <a:t> </a:t>
             </a:r>
           </a:p>
         </p:txBody>
       </p:sp>
       <p:sp>
         <p:nvSpPr>
-          <p:cNvPr id="26" name="Rounded Rectangle 25"/>
-          <p:cNvSpPr/>
+          <p:cNvPr id="27" name="TextBox 26">
+            <a:extLst>
+              <a:ext uri="{FF2B5EF4-FFF2-40B4-BE49-F238E27FC236}">
+                <a16:creationId xmlns:a16="http://schemas.microsoft.com/office/drawing/2014/main" id="{30295DDF-4563-487E-AA7B-90ACD841E4AB}"/>
+              </a:ext>
+            </a:extLst>
+          </p:cNvPr>
+          <p:cNvSpPr txBox="1"/>
           <p:nvPr/>
         </p:nvSpPr>
         <p:spPr>
           <a:xfrm>
-            <a:off x="4979876" y="2258869"/>
-            <a:ext cx="1872208" cy="3346833"/>
+            <a:off x="898356" y="2704227"/>
+            <a:ext cx="3367769" cy="707886"/>
           </a:xfrm>
-          <a:prstGeom prst="roundRect">
+          <a:prstGeom prst="rect">
             <a:avLst/>
           </a:prstGeom>
           <a:noFill/>
-          <a:ln w="38100">
-            <a:solidFill>
-              <a:srgbClr val="288ABA"/>
-            </a:solidFill>
-          </a:ln>
         </p:spPr>
-        <p:style>
-          <a:lnRef idx="2">
-            <a:schemeClr val="accent1">
-              <a:shade val="50000"/>
-            </a:schemeClr>
-          </a:lnRef>
-          <a:fillRef idx="1">
-            <a:schemeClr val="accent1"/>
-          </a:fillRef>
-          <a:effectRef idx="0">
-            <a:schemeClr val="accent1"/>
-          </a:effectRef>
-          <a:fontRef idx="minor">
-            <a:schemeClr val="lt1"/>
-          </a:fontRef>
-        </p:style>
         <p:txBody>
-          <a:bodyPr rtlCol="0" anchor="ctr"/>
+          <a:bodyPr wrap="square" rtlCol="0">
+            <a:spAutoFit/>
+          </a:bodyPr>
           <a:lstStyle/>
           <a:p>
-            <a:pPr algn="ctr"/>
-            <a:r>
-              <a:rPr lang="en-US" sz="2000" dirty="0" err="1"/>
-              <a:t>Motorul</a:t>
-            </a:r>
-            <a:endParaRPr lang="en-US" sz="2000" dirty="0"/>
-          </a:p>
-          <a:p>
-            <a:pPr algn="ctr"/>
-            <a:r>
-              <a:rPr lang="en-US" sz="2000" dirty="0"/>
-              <a:t>CEP</a:t>
+            <a:pPr marL="342900" indent="-342900">
+              <a:buFont typeface="Arial" panose="020B0604020202020204" pitchFamily="34" charset="0"/>
+              <a:buChar char="•"/>
+            </a:pPr>
+            <a:r>
+              <a:rPr lang="ro-RO" sz="2000" dirty="0">
+                <a:solidFill>
+                  <a:schemeClr val="bg1"/>
+                </a:solidFill>
+                <a:latin typeface="UT Sans"/>
+              </a:rPr>
+              <a:t>Reacționarea în timp real la fluxuri mari de date</a:t>
+            </a:r>
+            <a:r>
+              <a:rPr lang="en-US" sz="2000" dirty="0">
+                <a:solidFill>
+                  <a:schemeClr val="bg1"/>
+                </a:solidFill>
+                <a:latin typeface="UT Sans"/>
+              </a:rPr>
+              <a:t> </a:t>
             </a:r>
           </a:p>
         </p:txBody>
       </p:sp>
       <p:sp>
         <p:nvSpPr>
-          <p:cNvPr id="29" name="Right Arrow 28"/>
-          <p:cNvSpPr/>
+          <p:cNvPr id="28" name="TextBox 27">
+            <a:extLst>
+              <a:ext uri="{FF2B5EF4-FFF2-40B4-BE49-F238E27FC236}">
+                <a16:creationId xmlns:a16="http://schemas.microsoft.com/office/drawing/2014/main" id="{2FC1FF60-DE0B-4D75-9BC3-9999919251F1}"/>
+              </a:ext>
+            </a:extLst>
+          </p:cNvPr>
+          <p:cNvSpPr txBox="1"/>
           <p:nvPr/>
         </p:nvSpPr>
         <p:spPr>
           <a:xfrm>
-            <a:off x="3802766" y="2507170"/>
-            <a:ext cx="1059390" cy="182701"/>
-          </a:xfrm>
-          <a:prstGeom prst="rightArrow">
-            <a:avLst>
-              <a:gd name="adj1" fmla="val 50000"/>
-              <a:gd name="adj2" fmla="val 212259"/>
-            </a:avLst>
-          </a:prstGeom>
-          <a:solidFill>
-            <a:schemeClr val="accent1"/>
-          </a:solidFill>
-          <a:ln>
-            <a:solidFill>
-              <a:schemeClr val="accent1"/>
-            </a:solidFill>
-          </a:ln>
-        </p:spPr>
-        <p:style>
-          <a:lnRef idx="2">
-            <a:schemeClr val="accent1">
-              <a:shade val="50000"/>
-            </a:schemeClr>
-          </a:lnRef>
-          <a:fillRef idx="1">
-            <a:schemeClr val="accent1"/>
-          </a:fillRef>
-          <a:effectRef idx="0">
-            <a:schemeClr val="accent1"/>
-          </a:effectRef>
-          <a:fontRef idx="minor">
-            <a:schemeClr val="lt1"/>
-          </a:fontRef>
-        </p:style>
-        <p:txBody>
-          <a:bodyPr rtlCol="0" anchor="ctr"/>
-          <a:lstStyle/>
-          <a:p>
-            <a:pPr algn="ctr"/>
-            <a:endParaRPr lang="en-US"/>
-          </a:p>
-        </p:txBody>
-      </p:sp>
-      <p:sp>
-        <p:nvSpPr>
-          <p:cNvPr id="31" name="Right Arrow 30"/>
-          <p:cNvSpPr/>
-          <p:nvPr/>
-        </p:nvSpPr>
-        <p:spPr>
-          <a:xfrm>
-            <a:off x="3802766" y="3379424"/>
-            <a:ext cx="1059390" cy="182701"/>
-          </a:xfrm>
-          <a:prstGeom prst="rightArrow">
-            <a:avLst>
-              <a:gd name="adj1" fmla="val 50000"/>
-              <a:gd name="adj2" fmla="val 212259"/>
-            </a:avLst>
-          </a:prstGeom>
-          <a:solidFill>
-            <a:schemeClr val="accent1"/>
-          </a:solidFill>
-          <a:ln>
-            <a:solidFill>
-              <a:schemeClr val="accent1"/>
-            </a:solidFill>
-          </a:ln>
-        </p:spPr>
-        <p:style>
-          <a:lnRef idx="2">
-            <a:schemeClr val="accent1">
-              <a:shade val="50000"/>
-            </a:schemeClr>
-          </a:lnRef>
-          <a:fillRef idx="1">
-            <a:schemeClr val="accent1"/>
-          </a:fillRef>
-          <a:effectRef idx="0">
-            <a:schemeClr val="accent1"/>
-          </a:effectRef>
-          <a:fontRef idx="minor">
-            <a:schemeClr val="lt1"/>
-          </a:fontRef>
-        </p:style>
-        <p:txBody>
-          <a:bodyPr rtlCol="0" anchor="ctr"/>
-          <a:lstStyle/>
-          <a:p>
-            <a:pPr algn="ctr"/>
-            <a:endParaRPr lang="en-US"/>
-          </a:p>
-        </p:txBody>
-      </p:sp>
-      <p:sp>
-        <p:nvSpPr>
-          <p:cNvPr id="32" name="Right Arrow 31"/>
-          <p:cNvSpPr/>
-          <p:nvPr/>
-        </p:nvSpPr>
-        <p:spPr>
-          <a:xfrm>
-            <a:off x="3783525" y="5157146"/>
-            <a:ext cx="1059390" cy="182701"/>
-          </a:xfrm>
-          <a:prstGeom prst="rightArrow">
-            <a:avLst>
-              <a:gd name="adj1" fmla="val 50000"/>
-              <a:gd name="adj2" fmla="val 212259"/>
-            </a:avLst>
-          </a:prstGeom>
-          <a:solidFill>
-            <a:schemeClr val="accent1"/>
-          </a:solidFill>
-          <a:ln>
-            <a:solidFill>
-              <a:schemeClr val="accent1"/>
-            </a:solidFill>
-          </a:ln>
-        </p:spPr>
-        <p:style>
-          <a:lnRef idx="2">
-            <a:schemeClr val="accent1">
-              <a:shade val="50000"/>
-            </a:schemeClr>
-          </a:lnRef>
-          <a:fillRef idx="1">
-            <a:schemeClr val="accent1"/>
-          </a:fillRef>
-          <a:effectRef idx="0">
-            <a:schemeClr val="accent1"/>
-          </a:effectRef>
-          <a:fontRef idx="minor">
-            <a:schemeClr val="lt1"/>
-          </a:fontRef>
-        </p:style>
-        <p:txBody>
-          <a:bodyPr rtlCol="0" anchor="ctr"/>
-          <a:lstStyle/>
-          <a:p>
-            <a:pPr algn="ctr"/>
-            <a:endParaRPr lang="en-US"/>
-          </a:p>
-        </p:txBody>
-      </p:sp>
-      <p:sp>
-        <p:nvSpPr>
-          <p:cNvPr id="33" name="Right Arrow 32"/>
-          <p:cNvSpPr/>
-          <p:nvPr/>
-        </p:nvSpPr>
-        <p:spPr>
-          <a:xfrm>
-            <a:off x="7109577" y="3790480"/>
-            <a:ext cx="1653948" cy="173636"/>
-          </a:xfrm>
-          <a:prstGeom prst="rightArrow">
-            <a:avLst>
-              <a:gd name="adj1" fmla="val 50000"/>
-              <a:gd name="adj2" fmla="val 212259"/>
-            </a:avLst>
-          </a:prstGeom>
-          <a:solidFill>
-            <a:schemeClr val="accent1"/>
-          </a:solidFill>
-          <a:ln>
-            <a:solidFill>
-              <a:schemeClr val="accent1"/>
-            </a:solidFill>
-          </a:ln>
-        </p:spPr>
-        <p:style>
-          <a:lnRef idx="2">
-            <a:schemeClr val="accent1">
-              <a:shade val="50000"/>
-            </a:schemeClr>
-          </a:lnRef>
-          <a:fillRef idx="1">
-            <a:schemeClr val="accent1"/>
-          </a:fillRef>
-          <a:effectRef idx="0">
-            <a:schemeClr val="accent1"/>
-          </a:effectRef>
-          <a:fontRef idx="minor">
-            <a:schemeClr val="lt1"/>
-          </a:fontRef>
-        </p:style>
-        <p:txBody>
-          <a:bodyPr rtlCol="0" anchor="ctr"/>
-          <a:lstStyle/>
-          <a:p>
-            <a:pPr algn="ctr"/>
-            <a:endParaRPr lang="en-US"/>
-          </a:p>
-        </p:txBody>
-      </p:sp>
-      <p:sp>
-        <p:nvSpPr>
-          <p:cNvPr id="8" name="Rounded Rectangle 7"/>
-          <p:cNvSpPr/>
-          <p:nvPr/>
-        </p:nvSpPr>
-        <p:spPr>
-          <a:xfrm>
-            <a:off x="9018872" y="3553879"/>
-            <a:ext cx="1511004" cy="612068"/>
-          </a:xfrm>
-          <a:prstGeom prst="roundRect">
-            <a:avLst/>
-          </a:prstGeom>
-          <a:noFill/>
-          <a:ln w="38100"/>
-        </p:spPr>
-        <p:style>
-          <a:lnRef idx="2">
-            <a:schemeClr val="accent1">
-              <a:shade val="50000"/>
-            </a:schemeClr>
-          </a:lnRef>
-          <a:fillRef idx="1">
-            <a:schemeClr val="accent1"/>
-          </a:fillRef>
-          <a:effectRef idx="0">
-            <a:schemeClr val="accent1"/>
-          </a:effectRef>
-          <a:fontRef idx="minor">
-            <a:schemeClr val="lt1"/>
-          </a:fontRef>
-        </p:style>
-        <p:txBody>
-          <a:bodyPr rtlCol="0" anchor="ctr"/>
-          <a:lstStyle/>
-          <a:p>
-            <a:pPr algn="ctr"/>
-            <a:endParaRPr lang="en-US"/>
-          </a:p>
-        </p:txBody>
-      </p:sp>
-      <p:sp>
-        <p:nvSpPr>
-          <p:cNvPr id="9" name="Rectangle 8"/>
-          <p:cNvSpPr/>
-          <p:nvPr/>
-        </p:nvSpPr>
-        <p:spPr>
-          <a:xfrm>
-            <a:off x="2373194" y="2382094"/>
-            <a:ext cx="1031051" cy="307777"/>
+            <a:off x="874228" y="3405441"/>
+            <a:ext cx="3947033" cy="400110"/>
           </a:xfrm>
           <a:prstGeom prst="rect">
             <a:avLst/>
           </a:prstGeom>
+          <a:noFill/>
         </p:spPr>
         <p:txBody>
-          <a:bodyPr wrap="none">
+          <a:bodyPr wrap="square" rtlCol="0">
             <a:spAutoFit/>
           </a:bodyPr>
           <a:lstStyle/>
           <a:p>
-            <a:r>
-              <a:rPr lang="en-US" sz="1400" dirty="0" err="1">
+            <a:pPr marL="342900" indent="-342900">
+              <a:buFont typeface="Arial" panose="020B0604020202020204" pitchFamily="34" charset="0"/>
+              <a:buChar char="•"/>
+            </a:pPr>
+            <a:r>
+              <a:rPr lang="ro-RO" sz="2000" dirty="0">
                 <a:solidFill>
                   <a:schemeClr val="bg1"/>
                 </a:solidFill>
                 <a:latin typeface="UT Sans"/>
               </a:rPr>
-              <a:t>Eveniment</a:t>
-            </a:r>
-            <a:endParaRPr lang="en-US" dirty="0">
+              <a:t>Limbajul este asemănător cu SQL</a:t>
+            </a:r>
+            <a:endParaRPr lang="en-US" sz="2000" dirty="0">
               <a:solidFill>
                 <a:schemeClr val="bg1"/>
               </a:solidFill>
-            </a:endParaRPr>
-          </a:p>
-        </p:txBody>
-      </p:sp>
-      <p:sp>
-        <p:nvSpPr>
-          <p:cNvPr id="40" name="Rounded Rectangle 39"/>
-          <p:cNvSpPr/>
-          <p:nvPr/>
-        </p:nvSpPr>
-        <p:spPr>
-          <a:xfrm>
-            <a:off x="2135560" y="3156811"/>
-            <a:ext cx="1492918" cy="612068"/>
-          </a:xfrm>
-          <a:prstGeom prst="roundRect">
-            <a:avLst/>
-          </a:prstGeom>
-          <a:noFill/>
-          <a:ln w="38100"/>
-        </p:spPr>
-        <p:style>
-          <a:lnRef idx="2">
-            <a:schemeClr val="accent1">
-              <a:shade val="50000"/>
-            </a:schemeClr>
-          </a:lnRef>
-          <a:fillRef idx="1">
-            <a:schemeClr val="accent1"/>
-          </a:fillRef>
-          <a:effectRef idx="0">
-            <a:schemeClr val="accent1"/>
-          </a:effectRef>
-          <a:fontRef idx="minor">
-            <a:schemeClr val="lt1"/>
-          </a:fontRef>
-        </p:style>
-        <p:txBody>
-          <a:bodyPr rtlCol="0" anchor="ctr"/>
-          <a:lstStyle/>
-          <a:p>
-            <a:pPr algn="ctr"/>
-            <a:endParaRPr lang="en-US"/>
-          </a:p>
-        </p:txBody>
-      </p:sp>
-      <p:sp>
-        <p:nvSpPr>
-          <p:cNvPr id="41" name="Rectangle 40"/>
-          <p:cNvSpPr/>
-          <p:nvPr/>
-        </p:nvSpPr>
-        <p:spPr>
-          <a:xfrm>
-            <a:off x="2373194" y="3308956"/>
-            <a:ext cx="1031051" cy="307777"/>
-          </a:xfrm>
-          <a:prstGeom prst="rect">
-            <a:avLst/>
-          </a:prstGeom>
-        </p:spPr>
-        <p:txBody>
-          <a:bodyPr wrap="none">
-            <a:spAutoFit/>
-          </a:bodyPr>
-          <a:lstStyle/>
-          <a:p>
-            <a:r>
-              <a:rPr lang="en-US" sz="1400" dirty="0" err="1">
-                <a:solidFill>
-                  <a:schemeClr val="bg1"/>
-                </a:solidFill>
-                <a:latin typeface="UT Sans"/>
-              </a:rPr>
-              <a:t>Eveniment</a:t>
-            </a:r>
-            <a:endParaRPr lang="en-US" dirty="0">
-              <a:solidFill>
-                <a:schemeClr val="bg1"/>
-              </a:solidFill>
-            </a:endParaRPr>
-          </a:p>
-        </p:txBody>
-      </p:sp>
-      <p:sp>
-        <p:nvSpPr>
-          <p:cNvPr id="42" name="Rounded Rectangle 41"/>
-          <p:cNvSpPr/>
-          <p:nvPr/>
-        </p:nvSpPr>
-        <p:spPr>
-          <a:xfrm>
-            <a:off x="2144603" y="4947555"/>
-            <a:ext cx="1492918" cy="612068"/>
-          </a:xfrm>
-          <a:prstGeom prst="roundRect">
-            <a:avLst/>
-          </a:prstGeom>
-          <a:noFill/>
-          <a:ln w="38100"/>
-        </p:spPr>
-        <p:style>
-          <a:lnRef idx="2">
-            <a:schemeClr val="accent1">
-              <a:shade val="50000"/>
-            </a:schemeClr>
-          </a:lnRef>
-          <a:fillRef idx="1">
-            <a:schemeClr val="accent1"/>
-          </a:fillRef>
-          <a:effectRef idx="0">
-            <a:schemeClr val="accent1"/>
-          </a:effectRef>
-          <a:fontRef idx="minor">
-            <a:schemeClr val="lt1"/>
-          </a:fontRef>
-        </p:style>
-        <p:txBody>
-          <a:bodyPr rtlCol="0" anchor="ctr"/>
-          <a:lstStyle/>
-          <a:p>
-            <a:pPr algn="ctr"/>
-            <a:endParaRPr lang="en-US"/>
-          </a:p>
-        </p:txBody>
-      </p:sp>
-      <p:sp>
-        <p:nvSpPr>
-          <p:cNvPr id="43" name="Rectangle 42"/>
-          <p:cNvSpPr/>
-          <p:nvPr/>
-        </p:nvSpPr>
-        <p:spPr>
-          <a:xfrm>
-            <a:off x="2382237" y="5098124"/>
-            <a:ext cx="1031051" cy="307777"/>
-          </a:xfrm>
-          <a:prstGeom prst="rect">
-            <a:avLst/>
-          </a:prstGeom>
-        </p:spPr>
-        <p:txBody>
-          <a:bodyPr wrap="none">
-            <a:spAutoFit/>
-          </a:bodyPr>
-          <a:lstStyle/>
-          <a:p>
-            <a:r>
-              <a:rPr lang="en-US" sz="1400" dirty="0" err="1">
-                <a:solidFill>
-                  <a:schemeClr val="bg1"/>
-                </a:solidFill>
-                <a:latin typeface="UT Sans"/>
-              </a:rPr>
-              <a:t>Eveniment</a:t>
-            </a:r>
-            <a:endParaRPr lang="en-US" dirty="0">
-              <a:solidFill>
-                <a:schemeClr val="bg1"/>
-              </a:solidFill>
-            </a:endParaRPr>
-          </a:p>
-        </p:txBody>
-      </p:sp>
-      <p:sp>
-        <p:nvSpPr>
-          <p:cNvPr id="44" name="Rounded Rectangle 43"/>
-          <p:cNvSpPr/>
-          <p:nvPr/>
-        </p:nvSpPr>
-        <p:spPr>
-          <a:xfrm>
-            <a:off x="2126517" y="2258869"/>
-            <a:ext cx="1511004" cy="612068"/>
-          </a:xfrm>
-          <a:prstGeom prst="roundRect">
-            <a:avLst/>
-          </a:prstGeom>
-          <a:noFill/>
-          <a:ln w="38100"/>
-        </p:spPr>
-        <p:style>
-          <a:lnRef idx="2">
-            <a:schemeClr val="accent1">
-              <a:shade val="50000"/>
-            </a:schemeClr>
-          </a:lnRef>
-          <a:fillRef idx="1">
-            <a:schemeClr val="accent1"/>
-          </a:fillRef>
-          <a:effectRef idx="0">
-            <a:schemeClr val="accent1"/>
-          </a:effectRef>
-          <a:fontRef idx="minor">
-            <a:schemeClr val="lt1"/>
-          </a:fontRef>
-        </p:style>
-        <p:txBody>
-          <a:bodyPr rtlCol="0" anchor="ctr"/>
-          <a:lstStyle/>
-          <a:p>
-            <a:pPr algn="ctr"/>
-            <a:endParaRPr lang="en-US"/>
-          </a:p>
-        </p:txBody>
-      </p:sp>
-      <p:sp>
-        <p:nvSpPr>
-          <p:cNvPr id="45" name="Rectangle 44"/>
-          <p:cNvSpPr/>
-          <p:nvPr/>
-        </p:nvSpPr>
-        <p:spPr>
-          <a:xfrm>
-            <a:off x="9258848" y="3706024"/>
-            <a:ext cx="1031051" cy="307777"/>
-          </a:xfrm>
-          <a:prstGeom prst="rect">
-            <a:avLst/>
-          </a:prstGeom>
-        </p:spPr>
-        <p:txBody>
-          <a:bodyPr wrap="none">
-            <a:spAutoFit/>
-          </a:bodyPr>
-          <a:lstStyle/>
-          <a:p>
-            <a:r>
-              <a:rPr lang="en-US" sz="1400" dirty="0" err="1">
-                <a:solidFill>
-                  <a:schemeClr val="bg1"/>
-                </a:solidFill>
-                <a:latin typeface="UT Sans"/>
-              </a:rPr>
-              <a:t>Eveniment</a:t>
-            </a:r>
-            <a:endParaRPr lang="en-US" dirty="0">
-              <a:solidFill>
-                <a:schemeClr val="bg1"/>
-              </a:solidFill>
+              <a:latin typeface="UT Sans"/>
             </a:endParaRPr>
           </a:p>
         </p:txBody>
@@ -15991,326 +16196,6 @@
   <p:clrMapOvr>
     <a:masterClrMapping/>
   </p:clrMapOvr>
-  <p:timing>
-    <p:tnLst>
-      <p:par>
-        <p:cTn id="1" dur="indefinite" restart="never" nodeType="tmRoot">
-          <p:childTnLst>
-            <p:seq concurrent="1" nextAc="seek">
-              <p:cTn id="2" dur="indefinite" nodeType="mainSeq">
-                <p:childTnLst>
-                  <p:par>
-                    <p:cTn id="3" fill="hold">
-                      <p:stCondLst>
-                        <p:cond delay="indefinite"/>
-                      </p:stCondLst>
-                      <p:childTnLst>
-                        <p:par>
-                          <p:cTn id="4" fill="hold">
-                            <p:stCondLst>
-                              <p:cond delay="0"/>
-                            </p:stCondLst>
-                            <p:childTnLst>
-                              <p:par>
-                                <p:cTn id="5" presetID="1" presetClass="entr" presetSubtype="0" fill="hold" grpId="0" nodeType="clickEffect">
-                                  <p:stCondLst>
-                                    <p:cond delay="0"/>
-                                  </p:stCondLst>
-                                  <p:childTnLst>
-                                    <p:set>
-                                      <p:cBhvr>
-                                        <p:cTn id="6" dur="1" fill="hold">
-                                          <p:stCondLst>
-                                            <p:cond delay="0"/>
-                                          </p:stCondLst>
-                                        </p:cTn>
-                                        <p:tgtEl>
-                                          <p:spTgt spid="17"/>
-                                        </p:tgtEl>
-                                        <p:attrNameLst>
-                                          <p:attrName>style.visibility</p:attrName>
-                                        </p:attrNameLst>
-                                      </p:cBhvr>
-                                      <p:to>
-                                        <p:strVal val="visible"/>
-                                      </p:to>
-                                    </p:set>
-                                  </p:childTnLst>
-                                </p:cTn>
-                              </p:par>
-                              <p:par>
-                                <p:cTn id="7" presetID="1" presetClass="entr" presetSubtype="0" fill="hold" grpId="0" nodeType="withEffect">
-                                  <p:stCondLst>
-                                    <p:cond delay="200"/>
-                                  </p:stCondLst>
-                                  <p:childTnLst>
-                                    <p:set>
-                                      <p:cBhvr>
-                                        <p:cTn id="8" dur="1" fill="hold">
-                                          <p:stCondLst>
-                                            <p:cond delay="0"/>
-                                          </p:stCondLst>
-                                        </p:cTn>
-                                        <p:tgtEl>
-                                          <p:spTgt spid="18"/>
-                                        </p:tgtEl>
-                                        <p:attrNameLst>
-                                          <p:attrName>style.visibility</p:attrName>
-                                        </p:attrNameLst>
-                                      </p:cBhvr>
-                                      <p:to>
-                                        <p:strVal val="visible"/>
-                                      </p:to>
-                                    </p:set>
-                                  </p:childTnLst>
-                                </p:cTn>
-                              </p:par>
-                              <p:par>
-                                <p:cTn id="9" presetID="1" presetClass="entr" presetSubtype="0" fill="hold" grpId="0" nodeType="withEffect">
-                                  <p:stCondLst>
-                                    <p:cond delay="400"/>
-                                  </p:stCondLst>
-                                  <p:childTnLst>
-                                    <p:set>
-                                      <p:cBhvr>
-                                        <p:cTn id="10" dur="1" fill="hold">
-                                          <p:stCondLst>
-                                            <p:cond delay="0"/>
-                                          </p:stCondLst>
-                                        </p:cTn>
-                                        <p:tgtEl>
-                                          <p:spTgt spid="19"/>
-                                        </p:tgtEl>
-                                        <p:attrNameLst>
-                                          <p:attrName>style.visibility</p:attrName>
-                                        </p:attrNameLst>
-                                      </p:cBhvr>
-                                      <p:to>
-                                        <p:strVal val="visible"/>
-                                      </p:to>
-                                    </p:set>
-                                  </p:childTnLst>
-                                </p:cTn>
-                              </p:par>
-                              <p:par>
-                                <p:cTn id="11" presetID="1" presetClass="entr" presetSubtype="0" fill="hold" grpId="0" nodeType="withEffect">
-                                  <p:stCondLst>
-                                    <p:cond delay="200"/>
-                                  </p:stCondLst>
-                                  <p:childTnLst>
-                                    <p:set>
-                                      <p:cBhvr>
-                                        <p:cTn id="12" dur="1" fill="hold">
-                                          <p:stCondLst>
-                                            <p:cond delay="0"/>
-                                          </p:stCondLst>
-                                        </p:cTn>
-                                        <p:tgtEl>
-                                          <p:spTgt spid="25"/>
-                                        </p:tgtEl>
-                                        <p:attrNameLst>
-                                          <p:attrName>style.visibility</p:attrName>
-                                        </p:attrNameLst>
-                                      </p:cBhvr>
-                                      <p:to>
-                                        <p:strVal val="visible"/>
-                                      </p:to>
-                                    </p:set>
-                                  </p:childTnLst>
-                                </p:cTn>
-                              </p:par>
-                            </p:childTnLst>
-                          </p:cTn>
-                        </p:par>
-                      </p:childTnLst>
-                    </p:cTn>
-                  </p:par>
-                  <p:par>
-                    <p:cTn id="13" fill="hold">
-                      <p:stCondLst>
-                        <p:cond delay="indefinite"/>
-                      </p:stCondLst>
-                      <p:childTnLst>
-                        <p:par>
-                          <p:cTn id="14" fill="hold">
-                            <p:stCondLst>
-                              <p:cond delay="0"/>
-                            </p:stCondLst>
-                            <p:childTnLst>
-                              <p:par>
-                                <p:cTn id="15" presetID="1" presetClass="entr" presetSubtype="0" fill="hold" grpId="0" nodeType="clickEffect">
-                                  <p:stCondLst>
-                                    <p:cond delay="0"/>
-                                  </p:stCondLst>
-                                  <p:childTnLst>
-                                    <p:set>
-                                      <p:cBhvr>
-                                        <p:cTn id="16" dur="1" fill="hold">
-                                          <p:stCondLst>
-                                            <p:cond delay="0"/>
-                                          </p:stCondLst>
-                                        </p:cTn>
-                                        <p:tgtEl>
-                                          <p:spTgt spid="29"/>
-                                        </p:tgtEl>
-                                        <p:attrNameLst>
-                                          <p:attrName>style.visibility</p:attrName>
-                                        </p:attrNameLst>
-                                      </p:cBhvr>
-                                      <p:to>
-                                        <p:strVal val="visible"/>
-                                      </p:to>
-                                    </p:set>
-                                  </p:childTnLst>
-                                </p:cTn>
-                              </p:par>
-                              <p:par>
-                                <p:cTn id="17" presetID="1" presetClass="entr" presetSubtype="0" fill="hold" grpId="0" nodeType="withEffect">
-                                  <p:stCondLst>
-                                    <p:cond delay="0"/>
-                                  </p:stCondLst>
-                                  <p:childTnLst>
-                                    <p:set>
-                                      <p:cBhvr>
-                                        <p:cTn id="18" dur="1" fill="hold">
-                                          <p:stCondLst>
-                                            <p:cond delay="0"/>
-                                          </p:stCondLst>
-                                        </p:cTn>
-                                        <p:tgtEl>
-                                          <p:spTgt spid="31"/>
-                                        </p:tgtEl>
-                                        <p:attrNameLst>
-                                          <p:attrName>style.visibility</p:attrName>
-                                        </p:attrNameLst>
-                                      </p:cBhvr>
-                                      <p:to>
-                                        <p:strVal val="visible"/>
-                                      </p:to>
-                                    </p:set>
-                                  </p:childTnLst>
-                                </p:cTn>
-                              </p:par>
-                              <p:par>
-                                <p:cTn id="19" presetID="1" presetClass="entr" presetSubtype="0" fill="hold" grpId="0" nodeType="withEffect">
-                                  <p:stCondLst>
-                                    <p:cond delay="0"/>
-                                  </p:stCondLst>
-                                  <p:childTnLst>
-                                    <p:set>
-                                      <p:cBhvr>
-                                        <p:cTn id="20" dur="1" fill="hold">
-                                          <p:stCondLst>
-                                            <p:cond delay="0"/>
-                                          </p:stCondLst>
-                                        </p:cTn>
-                                        <p:tgtEl>
-                                          <p:spTgt spid="32"/>
-                                        </p:tgtEl>
-                                        <p:attrNameLst>
-                                          <p:attrName>style.visibility</p:attrName>
-                                        </p:attrNameLst>
-                                      </p:cBhvr>
-                                      <p:to>
-                                        <p:strVal val="visible"/>
-                                      </p:to>
-                                    </p:set>
-                                  </p:childTnLst>
-                                </p:cTn>
-                              </p:par>
-                              <p:par>
-                                <p:cTn id="21" presetID="1" presetClass="entr" presetSubtype="0" fill="hold" grpId="0" nodeType="withEffect">
-                                  <p:stCondLst>
-                                    <p:cond delay="0"/>
-                                  </p:stCondLst>
-                                  <p:childTnLst>
-                                    <p:set>
-                                      <p:cBhvr>
-                                        <p:cTn id="22" dur="1" fill="hold">
-                                          <p:stCondLst>
-                                            <p:cond delay="0"/>
-                                          </p:stCondLst>
-                                        </p:cTn>
-                                        <p:tgtEl>
-                                          <p:spTgt spid="26"/>
-                                        </p:tgtEl>
-                                        <p:attrNameLst>
-                                          <p:attrName>style.visibility</p:attrName>
-                                        </p:attrNameLst>
-                                      </p:cBhvr>
-                                      <p:to>
-                                        <p:strVal val="visible"/>
-                                      </p:to>
-                                    </p:set>
-                                  </p:childTnLst>
-                                </p:cTn>
-                              </p:par>
-                              <p:par>
-                                <p:cTn id="23" presetID="1" presetClass="entr" presetSubtype="0" fill="hold" grpId="0" nodeType="withEffect">
-                                  <p:stCondLst>
-                                    <p:cond delay="10"/>
-                                  </p:stCondLst>
-                                  <p:childTnLst>
-                                    <p:set>
-                                      <p:cBhvr>
-                                        <p:cTn id="24" dur="1" fill="hold">
-                                          <p:stCondLst>
-                                            <p:cond delay="0"/>
-                                          </p:stCondLst>
-                                        </p:cTn>
-                                        <p:tgtEl>
-                                          <p:spTgt spid="33"/>
-                                        </p:tgtEl>
-                                        <p:attrNameLst>
-                                          <p:attrName>style.visibility</p:attrName>
-                                        </p:attrNameLst>
-                                      </p:cBhvr>
-                                      <p:to>
-                                        <p:strVal val="visible"/>
-                                      </p:to>
-                                    </p:set>
-                                  </p:childTnLst>
-                                </p:cTn>
-                              </p:par>
-                            </p:childTnLst>
-                          </p:cTn>
-                        </p:par>
-                      </p:childTnLst>
-                    </p:cTn>
-                  </p:par>
-                </p:childTnLst>
-              </p:cTn>
-              <p:prevCondLst>
-                <p:cond evt="onPrev" delay="0">
-                  <p:tgtEl>
-                    <p:sldTgt/>
-                  </p:tgtEl>
-                </p:cond>
-              </p:prevCondLst>
-              <p:nextCondLst>
-                <p:cond evt="onNext" delay="0">
-                  <p:tgtEl>
-                    <p:sldTgt/>
-                  </p:tgtEl>
-                </p:cond>
-              </p:nextCondLst>
-            </p:seq>
-          </p:childTnLst>
-        </p:cTn>
-      </p:par>
-    </p:tnLst>
-    <p:bldLst>
-      <p:bldP spid="17" grpId="0"/>
-      <p:bldP spid="18" grpId="0"/>
-      <p:bldP spid="19" grpId="0"/>
-      <p:bldP spid="25" grpId="0"/>
-      <p:bldP spid="26" grpId="0" animBg="1"/>
-      <p:bldP spid="29" grpId="0" animBg="1"/>
-      <p:bldP spid="31" grpId="0" animBg="1"/>
-      <p:bldP spid="32" grpId="0" animBg="1"/>
-      <p:bldP spid="33" grpId="0" animBg="1"/>
-    </p:bldLst>
-  </p:timing>
 </p:sld>
 </file>
 

</xml_diff>